<commit_message>
Update Risk-aware UAV-UGV rendezvous via CMDP.pptx
</commit_message>
<xml_diff>
--- a/Risk-aware UAV-UGV rendezvous via CMDP.pptx
+++ b/Risk-aware UAV-UGV rendezvous via CMDP.pptx
@@ -5,7 +5,7 @@
     <p:sldMasterId id="2147483660" r:id="rId1"/>
   </p:sldMasterIdLst>
   <p:notesMasterIdLst>
-    <p:notesMasterId r:id="rId25"/>
+    <p:notesMasterId r:id="rId26"/>
   </p:notesMasterIdLst>
   <p:sldIdLst>
     <p:sldId id="256" r:id="rId2"/>
@@ -29,8 +29,9 @@
     <p:sldId id="284" r:id="rId20"/>
     <p:sldId id="285" r:id="rId21"/>
     <p:sldId id="286" r:id="rId22"/>
-    <p:sldId id="275" r:id="rId23"/>
-    <p:sldId id="273" r:id="rId24"/>
+    <p:sldId id="287" r:id="rId23"/>
+    <p:sldId id="275" r:id="rId24"/>
+    <p:sldId id="273" r:id="rId25"/>
   </p:sldIdLst>
   <p:sldSz cx="9144000" cy="6858000" type="screen4x3"/>
   <p:notesSz cx="6858000" cy="9144000"/>
@@ -12102,6 +12103,161 @@
       </p:grpSpPr>
       <p:sp>
         <p:nvSpPr>
+          <p:cNvPr id="2" name="TextBox 1">
+            <a:extLst>
+              <a:ext uri="{FF2B5EF4-FFF2-40B4-BE49-F238E27FC236}">
+                <a16:creationId xmlns:a16="http://schemas.microsoft.com/office/drawing/2014/main" id="{B0FDE397-B84E-421D-9C4F-37AB0A7DF879}"/>
+              </a:ext>
+            </a:extLst>
+          </p:cNvPr>
+          <p:cNvSpPr txBox="1"/>
+          <p:nvPr/>
+        </p:nvSpPr>
+        <p:spPr>
+          <a:xfrm>
+            <a:off x="1071154" y="775063"/>
+            <a:ext cx="6226629" cy="2308324"/>
+          </a:xfrm>
+          <a:prstGeom prst="rect">
+            <a:avLst/>
+          </a:prstGeom>
+          <a:noFill/>
+        </p:spPr>
+        <p:txBody>
+          <a:bodyPr wrap="square" rtlCol="0">
+            <a:spAutoFit/>
+          </a:bodyPr>
+          <a:lstStyle/>
+          <a:p>
+            <a:pPr marL="285750" indent="-285750">
+              <a:buFont typeface="Arial" panose="020B0604020202020204" pitchFamily="34" charset="0"/>
+              <a:buChar char="•"/>
+            </a:pPr>
+            <a:r>
+              <a:rPr lang="en-US" altLang="zh-CN" dirty="0"/>
+              <a:t>Same Algorithm and test for rendezvous problem</a:t>
+            </a:r>
+          </a:p>
+          <a:p>
+            <a:pPr marL="285750" indent="-285750">
+              <a:buFont typeface="Arial" panose="020B0604020202020204" pitchFamily="34" charset="0"/>
+              <a:buChar char="•"/>
+            </a:pPr>
+            <a:endParaRPr lang="en-US" dirty="0"/>
+          </a:p>
+          <a:p>
+            <a:endParaRPr lang="en-US" dirty="0"/>
+          </a:p>
+          <a:p>
+            <a:pPr marL="285750" indent="-285750">
+              <a:buFont typeface="Arial" panose="020B0604020202020204" pitchFamily="34" charset="0"/>
+              <a:buChar char="•"/>
+            </a:pPr>
+            <a:r>
+              <a:rPr lang="en-US" dirty="0"/>
+              <a:t>LP, approximate LP, heuristic search </a:t>
+            </a:r>
+          </a:p>
+          <a:p>
+            <a:pPr marL="285750" indent="-285750">
+              <a:buFont typeface="Arial" panose="020B0604020202020204" pitchFamily="34" charset="0"/>
+              <a:buChar char="•"/>
+            </a:pPr>
+            <a:endParaRPr lang="en-US" dirty="0"/>
+          </a:p>
+          <a:p>
+            <a:pPr marL="285750" indent="-285750">
+              <a:buFont typeface="Arial" panose="020B0604020202020204" pitchFamily="34" charset="0"/>
+              <a:buChar char="•"/>
+            </a:pPr>
+            <a:endParaRPr lang="en-US" dirty="0"/>
+          </a:p>
+          <a:p>
+            <a:pPr marL="285750" indent="-285750">
+              <a:buFont typeface="Arial" panose="020B0604020202020204" pitchFamily="34" charset="0"/>
+              <a:buChar char="•"/>
+            </a:pPr>
+            <a:r>
+              <a:rPr lang="en-US" dirty="0"/>
+              <a:t>Multi-objective MCTS</a:t>
+            </a:r>
+          </a:p>
+          <a:p>
+            <a:endParaRPr lang="en-US" dirty="0"/>
+          </a:p>
+        </p:txBody>
+      </p:sp>
+      <p:sp>
+        <p:nvSpPr>
+          <p:cNvPr id="3" name="TextBox 2">
+            <a:extLst>
+              <a:ext uri="{FF2B5EF4-FFF2-40B4-BE49-F238E27FC236}">
+                <a16:creationId xmlns:a16="http://schemas.microsoft.com/office/drawing/2014/main" id="{3895924C-6BA6-4252-A19C-4D5FC59E4562}"/>
+              </a:ext>
+            </a:extLst>
+          </p:cNvPr>
+          <p:cNvSpPr txBox="1"/>
+          <p:nvPr/>
+        </p:nvSpPr>
+        <p:spPr>
+          <a:xfrm>
+            <a:off x="1776549" y="2926080"/>
+            <a:ext cx="3788228" cy="369332"/>
+          </a:xfrm>
+          <a:prstGeom prst="rect">
+            <a:avLst/>
+          </a:prstGeom>
+          <a:noFill/>
+        </p:spPr>
+        <p:txBody>
+          <a:bodyPr wrap="square" rtlCol="0">
+            <a:spAutoFit/>
+          </a:bodyPr>
+          <a:lstStyle/>
+          <a:p>
+            <a:pPr marL="285750" indent="-285750">
+              <a:buFont typeface="Wingdings" panose="05000000000000000000" pitchFamily="2" charset="2"/>
+              <a:buChar char="§"/>
+            </a:pPr>
+            <a:r>
+              <a:rPr lang="en-US" dirty="0"/>
+              <a:t>Trade off performance with risk</a:t>
+            </a:r>
+          </a:p>
+        </p:txBody>
+      </p:sp>
+    </p:spTree>
+    <p:extLst>
+      <p:ext uri="{BB962C8B-B14F-4D97-AF65-F5344CB8AC3E}">
+        <p14:creationId xmlns:p14="http://schemas.microsoft.com/office/powerpoint/2010/main" val="2701278147"/>
+      </p:ext>
+    </p:extLst>
+  </p:cSld>
+  <p:clrMapOvr>
+    <a:masterClrMapping/>
+  </p:clrMapOvr>
+</p:sld>
+</file>
+
+<file path=ppt/slides/slide23.xml><?xml version="1.0" encoding="utf-8"?>
+<p:sld xmlns:a="http://schemas.openxmlformats.org/drawingml/2006/main" xmlns:r="http://schemas.openxmlformats.org/officeDocument/2006/relationships" xmlns:p="http://schemas.openxmlformats.org/presentationml/2006/main">
+  <p:cSld>
+    <p:spTree>
+      <p:nvGrpSpPr>
+        <p:cNvPr id="1" name=""/>
+        <p:cNvGrpSpPr/>
+        <p:nvPr/>
+      </p:nvGrpSpPr>
+      <p:grpSpPr>
+        <a:xfrm>
+          <a:off x="0" y="0"/>
+          <a:ext cx="0" cy="0"/>
+          <a:chOff x="0" y="0"/>
+          <a:chExt cx="0" cy="0"/>
+        </a:xfrm>
+      </p:grpSpPr>
+      <p:sp>
+        <p:nvSpPr>
           <p:cNvPr id="4" name="TextBox 3"/>
           <p:cNvSpPr txBox="1"/>
           <p:nvPr/>
@@ -13999,7 +14155,7 @@
 </p:sld>
 </file>
 
-<file path=ppt/slides/slide23.xml><?xml version="1.0" encoding="utf-8"?>
+<file path=ppt/slides/slide24.xml><?xml version="1.0" encoding="utf-8"?>
 <p:sld xmlns:a="http://schemas.openxmlformats.org/drawingml/2006/main" xmlns:r="http://schemas.openxmlformats.org/officeDocument/2006/relationships" xmlns:p="http://schemas.openxmlformats.org/presentationml/2006/main">
   <p:cSld>
     <p:spTree>

</xml_diff>

<commit_message>
start from a large lambda
</commit_message>
<xml_diff>
--- a/Risk-aware UAV-UGV rendezvous via CMDP.pptx
+++ b/Risk-aware UAV-UGV rendezvous via CMDP.pptx
@@ -12184,45 +12184,6 @@
           </a:p>
           <a:p>
             <a:endParaRPr lang="en-US" dirty="0"/>
-          </a:p>
-        </p:txBody>
-      </p:sp>
-      <p:sp>
-        <p:nvSpPr>
-          <p:cNvPr id="3" name="TextBox 2">
-            <a:extLst>
-              <a:ext uri="{FF2B5EF4-FFF2-40B4-BE49-F238E27FC236}">
-                <a16:creationId xmlns:a16="http://schemas.microsoft.com/office/drawing/2014/main" id="{3895924C-6BA6-4252-A19C-4D5FC59E4562}"/>
-              </a:ext>
-            </a:extLst>
-          </p:cNvPr>
-          <p:cNvSpPr txBox="1"/>
-          <p:nvPr/>
-        </p:nvSpPr>
-        <p:spPr>
-          <a:xfrm>
-            <a:off x="1776549" y="2926080"/>
-            <a:ext cx="3788228" cy="369332"/>
-          </a:xfrm>
-          <a:prstGeom prst="rect">
-            <a:avLst/>
-          </a:prstGeom>
-          <a:noFill/>
-        </p:spPr>
-        <p:txBody>
-          <a:bodyPr wrap="square" rtlCol="0">
-            <a:spAutoFit/>
-          </a:bodyPr>
-          <a:lstStyle/>
-          <a:p>
-            <a:pPr marL="285750" indent="-285750">
-              <a:buFont typeface="Wingdings" panose="05000000000000000000" pitchFamily="2" charset="2"/>
-              <a:buChar char="§"/>
-            </a:pPr>
-            <a:r>
-              <a:rPr lang="en-US" dirty="0"/>
-              <a:t>Trade off performance with risk</a:t>
-            </a:r>
           </a:p>
         </p:txBody>
       </p:sp>

</xml_diff>